<commit_message>
removed output, updated setup
</commit_message>
<xml_diff>
--- a/python-dataviz-startup.pptx
+++ b/python-dataviz-startup.pptx
@@ -7,6 +7,8 @@
   <p:sldIdLst>
     <p:sldId id="256" r:id="rId2"/>
     <p:sldId id="257" r:id="rId3"/>
+    <p:sldId id="258" r:id="rId4"/>
+    <p:sldId id="259" r:id="rId5"/>
   </p:sldIdLst>
   <p:sldSz cx="12192000" cy="6858000"/>
   <p:notesSz cx="6858000" cy="9144000"/>
@@ -604,7 +606,7 @@
           <a:p>
             <a:fld id="{746457D2-74BF-4DFF-8B35-95B9DD670100}" type="datetimeFigureOut">
               <a:rPr lang="en-US" smtClean="0"/>
-              <a:t>6/17/2022</a:t>
+              <a:t>6/18/2022</a:t>
             </a:fld>
             <a:endParaRPr lang="en-US"/>
           </a:p>
@@ -1951,7 +1953,7 @@
           <a:p>
             <a:fld id="{746457D2-74BF-4DFF-8B35-95B9DD670100}" type="datetimeFigureOut">
               <a:rPr lang="en-US" smtClean="0"/>
-              <a:t>6/17/2022</a:t>
+              <a:t>6/18/2022</a:t>
             </a:fld>
             <a:endParaRPr lang="en-US"/>
           </a:p>
@@ -2688,8 +2690,8 @@
           <a:lstStyle/>
           <a:p>
             <a:r>
-              <a:rPr lang="en-US"/>
-              <a:t>Miniconda Environment</a:t>
+              <a:rPr lang="en-US" dirty="0"/>
+              <a:t>Clone the GitHub Repo</a:t>
             </a:r>
           </a:p>
         </p:txBody>
@@ -2712,47 +2714,104 @@
         </p:nvSpPr>
         <p:spPr>
           <a:xfrm>
-            <a:off x="838200" y="1360075"/>
-            <a:ext cx="10515600" cy="4489188"/>
-          </a:xfrm>
-        </p:spPr>
-        <p:txBody>
-          <a:bodyPr/>
+            <a:off x="838199" y="1360075"/>
+            <a:ext cx="10889975" cy="4489188"/>
+          </a:xfrm>
+        </p:spPr>
+        <p:txBody>
+          <a:bodyPr>
+            <a:normAutofit fontScale="85000" lnSpcReduction="20000"/>
+          </a:bodyPr>
           <a:lstStyle/>
           <a:p>
-            <a:r>
-              <a:rPr lang="en-US"/>
-              <a:t>https://docs.conda.io/projects/conda/en/latest/user-guide/tasks/manage-environments.html</a:t>
-            </a:r>
-          </a:p>
-          <a:p>
-            <a:endParaRPr lang="en-US"/>
-          </a:p>
-          <a:p>
-            <a:pPr marL="0" indent="0">
-              <a:buNone/>
+            <a:pPr marL="347663" lvl="2" indent="-347663">
+              <a:lnSpc>
+                <a:spcPct val="120000"/>
+              </a:lnSpc>
             </a:pPr>
             <a:r>
-              <a:rPr lang="en-US"/>
-              <a:t>path=%PATH%;C:\Miniconda3;C:\Miniconda3\Scripts;</a:t>
-            </a:r>
-          </a:p>
-          <a:p>
-            <a:pPr marL="0" indent="0">
-              <a:buNone/>
+              <a:rPr lang="en-US" sz="3200" dirty="0"/>
+              <a:t>In a Windows command tool window</a:t>
+            </a:r>
+          </a:p>
+          <a:p>
+            <a:pPr marL="347663" lvl="2" indent="-347663">
+              <a:lnSpc>
+                <a:spcPct val="120000"/>
+              </a:lnSpc>
             </a:pPr>
             <a:r>
-              <a:rPr lang="en-US"/>
-              <a:t>conda info --envs</a:t>
-            </a:r>
-          </a:p>
-          <a:p>
-            <a:pPr marL="0" indent="0">
-              <a:buNone/>
+              <a:rPr lang="en-US" sz="3200" dirty="0"/>
+              <a:t>Change your current directory to your desired location to clone the repo, e.g. C:\Users\YourUserName)</a:t>
+            </a:r>
+          </a:p>
+          <a:p>
+            <a:pPr marL="347663" lvl="2" indent="-347663">
+              <a:lnSpc>
+                <a:spcPct val="120000"/>
+              </a:lnSpc>
             </a:pPr>
             <a:r>
-              <a:rPr lang="en-US"/>
-              <a:t>activate swc22dataviz</a:t>
+              <a:rPr lang="en-US" sz="3200" dirty="0"/>
+              <a:t>Run the following command:</a:t>
+            </a:r>
+          </a:p>
+          <a:p>
+            <a:pPr marL="461963" lvl="2" indent="0">
+              <a:lnSpc>
+                <a:spcPct val="120000"/>
+              </a:lnSpc>
+              <a:buNone/>
+            </a:pPr>
+            <a:r>
+              <a:rPr lang="en-US" sz="3200" b="1" dirty="0"/>
+              <a:t>git clone https://github.com/ProfSingletary/python-data-viz-workshop</a:t>
+            </a:r>
+          </a:p>
+          <a:p>
+            <a:pPr marL="347663" lvl="2" indent="-347663">
+              <a:lnSpc>
+                <a:spcPct val="120000"/>
+              </a:lnSpc>
+            </a:pPr>
+            <a:r>
+              <a:rPr lang="en-US" sz="3200" dirty="0"/>
+              <a:t>Change your current directory to the top level of the repo (python-data-viz-workshop)</a:t>
+            </a:r>
+          </a:p>
+          <a:p>
+            <a:pPr marL="347663" lvl="2" indent="-347663">
+              <a:lnSpc>
+                <a:spcPct val="120000"/>
+              </a:lnSpc>
+            </a:pPr>
+            <a:r>
+              <a:rPr lang="en-US" sz="3200" dirty="0"/>
+              <a:t>If desired, use the </a:t>
+            </a:r>
+            <a:r>
+              <a:rPr lang="en-US" sz="3200" dirty="0" err="1"/>
+              <a:t>subst</a:t>
+            </a:r>
+            <a:r>
+              <a:rPr lang="en-US" sz="3200" dirty="0"/>
+              <a:t> command to make your path shorter, e.g.</a:t>
+            </a:r>
+          </a:p>
+          <a:p>
+            <a:pPr marL="914400" lvl="2" indent="0">
+              <a:lnSpc>
+                <a:spcPct val="120000"/>
+              </a:lnSpc>
+              <a:buNone/>
+            </a:pPr>
+            <a:r>
+              <a:rPr lang="en-US" sz="3200" b="1" dirty="0" err="1"/>
+              <a:t>subst</a:t>
+            </a:r>
+            <a:r>
+              <a:rPr lang="en-US" sz="3200" b="1" dirty="0"/>
+              <a:t> p: C:\full_path_to_your_current_directory</a:t>
             </a:r>
           </a:p>
         </p:txBody>
@@ -2761,6 +2820,275 @@
     <p:extLst>
       <p:ext uri="{BB962C8B-B14F-4D97-AF65-F5344CB8AC3E}">
         <p14:creationId xmlns:p14="http://schemas.microsoft.com/office/powerpoint/2010/main" val="1540114189"/>
+      </p:ext>
+    </p:extLst>
+  </p:cSld>
+  <p:clrMapOvr>
+    <a:masterClrMapping/>
+  </p:clrMapOvr>
+</p:sld>
+</file>
+
+<file path=ppt/slides/slide3.xml><?xml version="1.0" encoding="utf-8"?>
+<p:sld xmlns:a="http://schemas.openxmlformats.org/drawingml/2006/main" xmlns:r="http://schemas.openxmlformats.org/officeDocument/2006/relationships" xmlns:p="http://schemas.openxmlformats.org/presentationml/2006/main">
+  <p:cSld>
+    <p:spTree>
+      <p:nvGrpSpPr>
+        <p:cNvPr id="1" name=""/>
+        <p:cNvGrpSpPr/>
+        <p:nvPr/>
+      </p:nvGrpSpPr>
+      <p:grpSpPr>
+        <a:xfrm>
+          <a:off x="0" y="0"/>
+          <a:ext cx="0" cy="0"/>
+          <a:chOff x="0" y="0"/>
+          <a:chExt cx="0" cy="0"/>
+        </a:xfrm>
+      </p:grpSpPr>
+      <p:sp>
+        <p:nvSpPr>
+          <p:cNvPr id="2" name="Title 1">
+            <a:extLst>
+              <a:ext uri="{FF2B5EF4-FFF2-40B4-BE49-F238E27FC236}">
+                <a16:creationId xmlns:a16="http://schemas.microsoft.com/office/drawing/2014/main" id="{E99061AE-B535-300A-405F-2FC4003577D7}"/>
+              </a:ext>
+            </a:extLst>
+          </p:cNvPr>
+          <p:cNvSpPr>
+            <a:spLocks noGrp="1"/>
+          </p:cNvSpPr>
+          <p:nvPr>
+            <p:ph type="title"/>
+          </p:nvPr>
+        </p:nvSpPr>
+        <p:spPr>
+          <a:xfrm>
+            <a:off x="838200" y="363392"/>
+            <a:ext cx="10515600" cy="843002"/>
+          </a:xfrm>
+        </p:spPr>
+        <p:txBody>
+          <a:bodyPr/>
+          <a:lstStyle/>
+          <a:p>
+            <a:r>
+              <a:rPr lang="en-US" dirty="0"/>
+              <a:t>Set Up the </a:t>
+            </a:r>
+            <a:r>
+              <a:rPr lang="en-US" dirty="0" err="1"/>
+              <a:t>Miniconda</a:t>
+            </a:r>
+            <a:r>
+              <a:rPr lang="en-US" dirty="0"/>
+              <a:t> Environment</a:t>
+            </a:r>
+          </a:p>
+        </p:txBody>
+      </p:sp>
+      <p:sp>
+        <p:nvSpPr>
+          <p:cNvPr id="3" name="Content Placeholder 2">
+            <a:extLst>
+              <a:ext uri="{FF2B5EF4-FFF2-40B4-BE49-F238E27FC236}">
+                <a16:creationId xmlns:a16="http://schemas.microsoft.com/office/drawing/2014/main" id="{C71CD1CC-B3D1-DF81-8C5B-40041DC83E70}"/>
+              </a:ext>
+            </a:extLst>
+          </p:cNvPr>
+          <p:cNvSpPr>
+            <a:spLocks noGrp="1"/>
+          </p:cNvSpPr>
+          <p:nvPr>
+            <p:ph idx="1"/>
+          </p:nvPr>
+        </p:nvSpPr>
+        <p:spPr>
+          <a:xfrm>
+            <a:off x="838200" y="1360075"/>
+            <a:ext cx="10515600" cy="4489188"/>
+          </a:xfrm>
+        </p:spPr>
+        <p:txBody>
+          <a:bodyPr>
+            <a:normAutofit/>
+          </a:bodyPr>
+          <a:lstStyle/>
+          <a:p>
+            <a:r>
+              <a:rPr lang="en-US" dirty="0"/>
+              <a:t>From a Windows command tool, run the following commands:</a:t>
+            </a:r>
+          </a:p>
+          <a:p>
+            <a:endParaRPr lang="en-US" sz="1200" dirty="0"/>
+          </a:p>
+          <a:p>
+            <a:pPr marL="461963" lvl="2" indent="0">
+              <a:buNone/>
+            </a:pPr>
+            <a:r>
+              <a:rPr lang="en-US" sz="2800" dirty="0"/>
+              <a:t>path=%PATH%;C:\Miniconda3;C:\Miniconda3\Scripts; C:\Miniconda3\Library\bin;</a:t>
+            </a:r>
+          </a:p>
+          <a:p>
+            <a:pPr marL="461963" lvl="2" indent="0">
+              <a:buNone/>
+            </a:pPr>
+            <a:endParaRPr lang="en-US" sz="1200" dirty="0"/>
+          </a:p>
+          <a:p>
+            <a:pPr marL="461963" lvl="2" indent="0">
+              <a:buNone/>
+            </a:pPr>
+            <a:r>
+              <a:rPr lang="en-US" sz="2800" dirty="0" err="1"/>
+              <a:t>conda</a:t>
+            </a:r>
+            <a:r>
+              <a:rPr lang="en-US" sz="2800" dirty="0"/>
+              <a:t> info --</a:t>
+            </a:r>
+            <a:r>
+              <a:rPr lang="en-US" sz="2800" dirty="0" err="1"/>
+              <a:t>envs</a:t>
+            </a:r>
+            <a:endParaRPr lang="en-US" sz="2800" dirty="0"/>
+          </a:p>
+          <a:p>
+            <a:pPr marL="461963" lvl="2" indent="0">
+              <a:buNone/>
+            </a:pPr>
+            <a:endParaRPr lang="en-US" sz="1200" dirty="0"/>
+          </a:p>
+          <a:p>
+            <a:pPr marL="461963" lvl="2" indent="0">
+              <a:buNone/>
+            </a:pPr>
+            <a:r>
+              <a:rPr lang="en-US" sz="2800" dirty="0"/>
+              <a:t>activate swc22dataviz</a:t>
+            </a:r>
+          </a:p>
+          <a:p>
+            <a:pPr marL="461963" lvl="2" indent="0">
+              <a:buNone/>
+            </a:pPr>
+            <a:endParaRPr lang="en-US" sz="2800" dirty="0"/>
+          </a:p>
+          <a:p>
+            <a:pPr marL="461963" lvl="2" indent="0">
+              <a:buNone/>
+            </a:pPr>
+            <a:endParaRPr lang="en-US" sz="2800" dirty="0"/>
+          </a:p>
+          <a:p>
+            <a:pPr marL="222250" lvl="2" indent="-222250"/>
+            <a:r>
+              <a:rPr lang="en-US" dirty="0"/>
+              <a:t>https://docs.conda.io/projects/conda/en/latest/user-guide/tasks/manage-environments.html</a:t>
+            </a:r>
+          </a:p>
+        </p:txBody>
+      </p:sp>
+    </p:spTree>
+    <p:extLst>
+      <p:ext uri="{BB962C8B-B14F-4D97-AF65-F5344CB8AC3E}">
+        <p14:creationId xmlns:p14="http://schemas.microsoft.com/office/powerpoint/2010/main" val="657044800"/>
+      </p:ext>
+    </p:extLst>
+  </p:cSld>
+  <p:clrMapOvr>
+    <a:masterClrMapping/>
+  </p:clrMapOvr>
+</p:sld>
+</file>
+
+<file path=ppt/slides/slide4.xml><?xml version="1.0" encoding="utf-8"?>
+<p:sld xmlns:a="http://schemas.openxmlformats.org/drawingml/2006/main" xmlns:r="http://schemas.openxmlformats.org/officeDocument/2006/relationships" xmlns:p="http://schemas.openxmlformats.org/presentationml/2006/main">
+  <p:cSld>
+    <p:spTree>
+      <p:nvGrpSpPr>
+        <p:cNvPr id="1" name=""/>
+        <p:cNvGrpSpPr/>
+        <p:nvPr/>
+      </p:nvGrpSpPr>
+      <p:grpSpPr>
+        <a:xfrm>
+          <a:off x="0" y="0"/>
+          <a:ext cx="0" cy="0"/>
+          <a:chOff x="0" y="0"/>
+          <a:chExt cx="0" cy="0"/>
+        </a:xfrm>
+      </p:grpSpPr>
+      <p:sp>
+        <p:nvSpPr>
+          <p:cNvPr id="2" name="Title 1">
+            <a:extLst>
+              <a:ext uri="{FF2B5EF4-FFF2-40B4-BE49-F238E27FC236}">
+                <a16:creationId xmlns:a16="http://schemas.microsoft.com/office/drawing/2014/main" id="{E99061AE-B535-300A-405F-2FC4003577D7}"/>
+              </a:ext>
+            </a:extLst>
+          </p:cNvPr>
+          <p:cNvSpPr>
+            <a:spLocks noGrp="1"/>
+          </p:cNvSpPr>
+          <p:nvPr>
+            <p:ph type="title"/>
+          </p:nvPr>
+        </p:nvSpPr>
+        <p:spPr>
+          <a:xfrm>
+            <a:off x="838200" y="363392"/>
+            <a:ext cx="10515600" cy="843002"/>
+          </a:xfrm>
+        </p:spPr>
+        <p:txBody>
+          <a:bodyPr/>
+          <a:lstStyle/>
+          <a:p>
+            <a:r>
+              <a:rPr lang="en-US" dirty="0"/>
+              <a:t>Notebook 0: Checking your setup</a:t>
+            </a:r>
+          </a:p>
+        </p:txBody>
+      </p:sp>
+      <p:pic>
+        <p:nvPicPr>
+          <p:cNvPr id="8" name="Picture 7">
+            <a:extLst>
+              <a:ext uri="{FF2B5EF4-FFF2-40B4-BE49-F238E27FC236}">
+                <a16:creationId xmlns:a16="http://schemas.microsoft.com/office/drawing/2014/main" id="{3D6F5138-36F3-4A33-97BA-A7CD9DB40750}"/>
+              </a:ext>
+            </a:extLst>
+          </p:cNvPr>
+          <p:cNvPicPr>
+            <a:picLocks noChangeAspect="1"/>
+          </p:cNvPicPr>
+          <p:nvPr/>
+        </p:nvPicPr>
+        <p:blipFill>
+          <a:blip r:embed="rId2"/>
+          <a:stretch>
+            <a:fillRect/>
+          </a:stretch>
+        </p:blipFill>
+        <p:spPr>
+          <a:xfrm>
+            <a:off x="1415347" y="1435328"/>
+            <a:ext cx="7775821" cy="4297680"/>
+          </a:xfrm>
+          <a:prstGeom prst="rect">
+            <a:avLst/>
+          </a:prstGeom>
+        </p:spPr>
+      </p:pic>
+    </p:spTree>
+    <p:extLst>
+      <p:ext uri="{BB962C8B-B14F-4D97-AF65-F5344CB8AC3E}">
+        <p14:creationId xmlns:p14="http://schemas.microsoft.com/office/powerpoint/2010/main" val="2389290691"/>
       </p:ext>
     </p:extLst>
   </p:cSld>

</xml_diff>

<commit_message>
fixed space in path
</commit_message>
<xml_diff>
--- a/python-dataviz-startup.pptx
+++ b/python-dataviz-startup.pptx
@@ -2780,21 +2780,21 @@
             </a:r>
           </a:p>
           <a:p>
-            <a:pPr marL="347663" lvl="2" indent="-347663">
+            <a:pPr marL="804863" lvl="3" indent="-347663">
               <a:lnSpc>
                 <a:spcPct val="120000"/>
               </a:lnSpc>
             </a:pPr>
             <a:r>
-              <a:rPr lang="en-US" sz="3200" dirty="0"/>
+              <a:rPr lang="en-US" sz="3000" dirty="0"/>
               <a:t>If desired, use the </a:t>
             </a:r>
             <a:r>
-              <a:rPr lang="en-US" sz="3200" dirty="0" err="1"/>
+              <a:rPr lang="en-US" sz="3000" dirty="0" err="1"/>
               <a:t>subst</a:t>
             </a:r>
             <a:r>
-              <a:rPr lang="en-US" sz="3200" dirty="0"/>
+              <a:rPr lang="en-US" sz="3000" dirty="0"/>
               <a:t> command to make your path shorter, e.g.</a:t>
             </a:r>
           </a:p>
@@ -2929,7 +2929,15 @@
             </a:pPr>
             <a:r>
               <a:rPr lang="en-US" sz="2800" dirty="0"/>
-              <a:t>path=%PATH%;C:\Miniconda3;C:\Miniconda3\Scripts; C:\Miniconda3\Library\bin;</a:t>
+              <a:t>path=%PATH%;C:\Miniconda3;C:\Miniconda3\</a:t>
+            </a:r>
+            <a:r>
+              <a:rPr lang="en-US" sz="2800" dirty="0" err="1"/>
+              <a:t>Scripts;C</a:t>
+            </a:r>
+            <a:r>
+              <a:rPr lang="en-US" sz="2800" dirty="0"/>
+              <a:t>:\Miniconda3\Library\bin;</a:t>
             </a:r>
           </a:p>
           <a:p>
@@ -2948,11 +2956,11 @@
             </a:r>
             <a:r>
               <a:rPr lang="en-US" sz="2800" dirty="0"/>
-              <a:t> info --</a:t>
+              <a:t> env create -f </a:t>
             </a:r>
             <a:r>
               <a:rPr lang="en-US" sz="2800" dirty="0" err="1"/>
-              <a:t>envs</a:t>
+              <a:t>environment.yml</a:t>
             </a:r>
             <a:endParaRPr lang="en-US" sz="2800" dirty="0"/>
           </a:p>
@@ -2968,7 +2976,7 @@
             </a:pPr>
             <a:r>
               <a:rPr lang="en-US" sz="2800" dirty="0"/>
-              <a:t>activate swc22dataviz</a:t>
+              <a:t>activate python-data-viz-workshop</a:t>
             </a:r>
           </a:p>
           <a:p>

</xml_diff>